<commit_message>
work on some sections; re-build
</commit_message>
<xml_diff>
--- a/images/cover-peng.pptx
+++ b/images/cover-peng.pptx
@@ -6,7 +6,9 @@
   </p:sldMasterIdLst>
   <p:sldIdLst>
     <p:sldId id="256" r:id="rId2"/>
-    <p:sldId id="257" r:id="rId3"/>
+    <p:sldId id="259" r:id="rId3"/>
+    <p:sldId id="257" r:id="rId4"/>
+    <p:sldId id="258" r:id="rId5"/>
   </p:sldIdLst>
   <p:sldSz cx="6408738" cy="8820150"/>
   <p:notesSz cx="6858000" cy="9144000"/>
@@ -244,7 +246,7 @@
           <a:p>
             <a:fld id="{8182B686-9897-4DFC-99DC-E49E7D95CC9D}" type="datetimeFigureOut">
               <a:rPr lang="en-CA" smtClean="0"/>
-              <a:t>6/07/23</a:t>
+              <a:t>2023-08-01</a:t>
             </a:fld>
             <a:endParaRPr lang="en-CA"/>
           </a:p>
@@ -414,7 +416,7 @@
           <a:p>
             <a:fld id="{8182B686-9897-4DFC-99DC-E49E7D95CC9D}" type="datetimeFigureOut">
               <a:rPr lang="en-CA" smtClean="0"/>
-              <a:t>6/07/23</a:t>
+              <a:t>2023-08-01</a:t>
             </a:fld>
             <a:endParaRPr lang="en-CA"/>
           </a:p>
@@ -594,7 +596,7 @@
           <a:p>
             <a:fld id="{8182B686-9897-4DFC-99DC-E49E7D95CC9D}" type="datetimeFigureOut">
               <a:rPr lang="en-CA" smtClean="0"/>
-              <a:t>6/07/23</a:t>
+              <a:t>2023-08-01</a:t>
             </a:fld>
             <a:endParaRPr lang="en-CA"/>
           </a:p>
@@ -764,7 +766,7 @@
           <a:p>
             <a:fld id="{8182B686-9897-4DFC-99DC-E49E7D95CC9D}" type="datetimeFigureOut">
               <a:rPr lang="en-CA" smtClean="0"/>
-              <a:t>6/07/23</a:t>
+              <a:t>2023-08-01</a:t>
             </a:fld>
             <a:endParaRPr lang="en-CA"/>
           </a:p>
@@ -1008,7 +1010,7 @@
           <a:p>
             <a:fld id="{8182B686-9897-4DFC-99DC-E49E7D95CC9D}" type="datetimeFigureOut">
               <a:rPr lang="en-CA" smtClean="0"/>
-              <a:t>6/07/23</a:t>
+              <a:t>2023-08-01</a:t>
             </a:fld>
             <a:endParaRPr lang="en-CA"/>
           </a:p>
@@ -1240,7 +1242,7 @@
           <a:p>
             <a:fld id="{8182B686-9897-4DFC-99DC-E49E7D95CC9D}" type="datetimeFigureOut">
               <a:rPr lang="en-CA" smtClean="0"/>
-              <a:t>6/07/23</a:t>
+              <a:t>2023-08-01</a:t>
             </a:fld>
             <a:endParaRPr lang="en-CA"/>
           </a:p>
@@ -1607,7 +1609,7 @@
           <a:p>
             <a:fld id="{8182B686-9897-4DFC-99DC-E49E7D95CC9D}" type="datetimeFigureOut">
               <a:rPr lang="en-CA" smtClean="0"/>
-              <a:t>6/07/23</a:t>
+              <a:t>2023-08-01</a:t>
             </a:fld>
             <a:endParaRPr lang="en-CA"/>
           </a:p>
@@ -1725,7 +1727,7 @@
           <a:p>
             <a:fld id="{8182B686-9897-4DFC-99DC-E49E7D95CC9D}" type="datetimeFigureOut">
               <a:rPr lang="en-CA" smtClean="0"/>
-              <a:t>6/07/23</a:t>
+              <a:t>2023-08-01</a:t>
             </a:fld>
             <a:endParaRPr lang="en-CA"/>
           </a:p>
@@ -1820,7 +1822,7 @@
           <a:p>
             <a:fld id="{8182B686-9897-4DFC-99DC-E49E7D95CC9D}" type="datetimeFigureOut">
               <a:rPr lang="en-CA" smtClean="0"/>
-              <a:t>6/07/23</a:t>
+              <a:t>2023-08-01</a:t>
             </a:fld>
             <a:endParaRPr lang="en-CA"/>
           </a:p>
@@ -2097,7 +2099,7 @@
           <a:p>
             <a:fld id="{8182B686-9897-4DFC-99DC-E49E7D95CC9D}" type="datetimeFigureOut">
               <a:rPr lang="en-CA" smtClean="0"/>
-              <a:t>6/07/23</a:t>
+              <a:t>2023-08-01</a:t>
             </a:fld>
             <a:endParaRPr lang="en-CA"/>
           </a:p>
@@ -2354,7 +2356,7 @@
           <a:p>
             <a:fld id="{8182B686-9897-4DFC-99DC-E49E7D95CC9D}" type="datetimeFigureOut">
               <a:rPr lang="en-CA" smtClean="0"/>
-              <a:t>6/07/23</a:t>
+              <a:t>2023-08-01</a:t>
             </a:fld>
             <a:endParaRPr lang="en-CA"/>
           </a:p>
@@ -2567,7 +2569,7 @@
           <a:p>
             <a:fld id="{8182B686-9897-4DFC-99DC-E49E7D95CC9D}" type="datetimeFigureOut">
               <a:rPr lang="en-CA" smtClean="0"/>
-              <a:t>6/07/23</a:t>
+              <a:t>2023-08-01</a:t>
             </a:fld>
             <a:endParaRPr lang="en-CA"/>
           </a:p>
@@ -3202,6 +3204,153 @@
       </p:sp>
       <p:pic>
         <p:nvPicPr>
+          <p:cNvPr id="2" name="Picture 1" descr="A diagram of different colored circles&#10;&#10;Description automatically generated">
+            <a:extLst>
+              <a:ext uri="{FF2B5EF4-FFF2-40B4-BE49-F238E27FC236}">
+                <a16:creationId xmlns:a16="http://schemas.microsoft.com/office/drawing/2014/main" id="{18B8CD33-D073-4FEF-1AE6-CA32CFC0056C}"/>
+              </a:ext>
+            </a:extLst>
+          </p:cNvPr>
+          <p:cNvPicPr>
+            <a:picLocks noChangeAspect="1"/>
+          </p:cNvPicPr>
+          <p:nvPr/>
+        </p:nvPicPr>
+        <p:blipFill>
+          <a:blip r:embed="rId3">
+            <a:extLst>
+              <a:ext uri="{28A0092B-C50C-407E-A947-70E740481C1C}">
+                <a14:useLocalDpi xmlns:a14="http://schemas.microsoft.com/office/drawing/2010/main" val="0"/>
+              </a:ext>
+            </a:extLst>
+          </a:blip>
+          <a:stretch>
+            <a:fillRect/>
+          </a:stretch>
+        </p:blipFill>
+        <p:spPr>
+          <a:xfrm>
+            <a:off x="846005" y="3270668"/>
+            <a:ext cx="4580952" cy="4628571"/>
+          </a:xfrm>
+          <a:prstGeom prst="rect">
+            <a:avLst/>
+          </a:prstGeom>
+        </p:spPr>
+      </p:pic>
+    </p:spTree>
+    <p:extLst>
+      <p:ext uri="{BB962C8B-B14F-4D97-AF65-F5344CB8AC3E}">
+        <p14:creationId xmlns:p14="http://schemas.microsoft.com/office/powerpoint/2010/main" val="3373436532"/>
+      </p:ext>
+    </p:extLst>
+  </p:cSld>
+  <p:clrMapOvr>
+    <a:masterClrMapping/>
+  </p:clrMapOvr>
+</p:sld>
+</file>
+
+<file path=ppt/slides/slide3.xml><?xml version="1.0" encoding="utf-8"?>
+<p:sld xmlns:a="http://schemas.openxmlformats.org/drawingml/2006/main" xmlns:r="http://schemas.openxmlformats.org/officeDocument/2006/relationships" xmlns:p="http://schemas.openxmlformats.org/presentationml/2006/main">
+  <p:cSld>
+    <p:bg>
+      <p:bgPr>
+        <a:blipFill>
+          <a:blip r:embed="rId2"/>
+          <a:tile tx="0" ty="0" sx="100000" sy="100000" flip="none" algn="tl"/>
+        </a:blipFill>
+        <a:effectLst/>
+      </p:bgPr>
+    </p:bg>
+    <p:spTree>
+      <p:nvGrpSpPr>
+        <p:cNvPr id="1" name=""/>
+        <p:cNvGrpSpPr/>
+        <p:nvPr/>
+      </p:nvGrpSpPr>
+      <p:grpSpPr>
+        <a:xfrm>
+          <a:off x="0" y="0"/>
+          <a:ext cx="0" cy="0"/>
+          <a:chOff x="0" y="0"/>
+          <a:chExt cx="0" cy="0"/>
+        </a:xfrm>
+      </p:grpSpPr>
+      <p:sp>
+        <p:nvSpPr>
+          <p:cNvPr id="4" name="TextBox 3">
+            <a:extLst>
+              <a:ext uri="{FF2B5EF4-FFF2-40B4-BE49-F238E27FC236}">
+                <a16:creationId xmlns:a16="http://schemas.microsoft.com/office/drawing/2014/main" id="{447B398F-7870-9F4B-9595-03B0D5EEAFDC}"/>
+              </a:ext>
+            </a:extLst>
+          </p:cNvPr>
+          <p:cNvSpPr txBox="1"/>
+          <p:nvPr/>
+        </p:nvSpPr>
+        <p:spPr>
+          <a:xfrm>
+            <a:off x="846005" y="920911"/>
+            <a:ext cx="4824663" cy="1077218"/>
+          </a:xfrm>
+          <a:prstGeom prst="rect">
+            <a:avLst/>
+          </a:prstGeom>
+          <a:noFill/>
+        </p:spPr>
+        <p:txBody>
+          <a:bodyPr wrap="square" rtlCol="0">
+            <a:spAutoFit/>
+          </a:bodyPr>
+          <a:lstStyle/>
+          <a:p>
+            <a:pPr algn="ctr"/>
+            <a:r>
+              <a:rPr lang="en-CA" sz="3200" dirty="0"/>
+              <a:t>Visualization of Multivariate Data and Models in R</a:t>
+            </a:r>
+          </a:p>
+        </p:txBody>
+      </p:sp>
+      <p:sp>
+        <p:nvSpPr>
+          <p:cNvPr id="5" name="TextBox 4">
+            <a:extLst>
+              <a:ext uri="{FF2B5EF4-FFF2-40B4-BE49-F238E27FC236}">
+                <a16:creationId xmlns:a16="http://schemas.microsoft.com/office/drawing/2014/main" id="{DFC20333-DD61-C369-0226-00FAF2A071B0}"/>
+              </a:ext>
+            </a:extLst>
+          </p:cNvPr>
+          <p:cNvSpPr txBox="1"/>
+          <p:nvPr/>
+        </p:nvSpPr>
+        <p:spPr>
+          <a:xfrm>
+            <a:off x="846005" y="2124068"/>
+            <a:ext cx="4824663" cy="369332"/>
+          </a:xfrm>
+          <a:prstGeom prst="rect">
+            <a:avLst/>
+          </a:prstGeom>
+          <a:noFill/>
+        </p:spPr>
+        <p:txBody>
+          <a:bodyPr wrap="square" rtlCol="0">
+            <a:spAutoFit/>
+          </a:bodyPr>
+          <a:lstStyle/>
+          <a:p>
+            <a:pPr algn="ctr"/>
+            <a:r>
+              <a:rPr lang="en-CA" dirty="0"/>
+              <a:t>Michael Friendly</a:t>
+            </a:r>
+          </a:p>
+        </p:txBody>
+      </p:sp>
+      <p:pic>
+        <p:nvPicPr>
           <p:cNvPr id="3" name="Picture 2">
             <a:extLst>
               <a:ext uri="{FF2B5EF4-FFF2-40B4-BE49-F238E27FC236}">
@@ -3240,6 +3389,72 @@
     <p:extLst>
       <p:ext uri="{BB962C8B-B14F-4D97-AF65-F5344CB8AC3E}">
         <p14:creationId xmlns:p14="http://schemas.microsoft.com/office/powerpoint/2010/main" val="3688330566"/>
+      </p:ext>
+    </p:extLst>
+  </p:cSld>
+  <p:clrMapOvr>
+    <a:masterClrMapping/>
+  </p:clrMapOvr>
+</p:sld>
+</file>
+
+<file path=ppt/slides/slide4.xml><?xml version="1.0" encoding="utf-8"?>
+<p:sld xmlns:a="http://schemas.openxmlformats.org/drawingml/2006/main" xmlns:r="http://schemas.openxmlformats.org/officeDocument/2006/relationships" xmlns:p="http://schemas.openxmlformats.org/presentationml/2006/main">
+  <p:cSld>
+    <p:spTree>
+      <p:nvGrpSpPr>
+        <p:cNvPr id="1" name=""/>
+        <p:cNvGrpSpPr/>
+        <p:nvPr/>
+      </p:nvGrpSpPr>
+      <p:grpSpPr>
+        <a:xfrm>
+          <a:off x="0" y="0"/>
+          <a:ext cx="0" cy="0"/>
+          <a:chOff x="0" y="0"/>
+          <a:chExt cx="0" cy="0"/>
+        </a:xfrm>
+      </p:grpSpPr>
+      <p:pic>
+        <p:nvPicPr>
+          <p:cNvPr id="3" name="Picture 2" descr="A diagram of different colored circles&#10;&#10;Description automatically generated">
+            <a:extLst>
+              <a:ext uri="{FF2B5EF4-FFF2-40B4-BE49-F238E27FC236}">
+                <a16:creationId xmlns:a16="http://schemas.microsoft.com/office/drawing/2014/main" id="{0AD8EF28-C841-DE7D-D3C3-7115C491A3E0}"/>
+              </a:ext>
+            </a:extLst>
+          </p:cNvPr>
+          <p:cNvPicPr>
+            <a:picLocks noChangeAspect="1"/>
+          </p:cNvPicPr>
+          <p:nvPr/>
+        </p:nvPicPr>
+        <p:blipFill>
+          <a:blip r:embed="rId2">
+            <a:extLst>
+              <a:ext uri="{28A0092B-C50C-407E-A947-70E740481C1C}">
+                <a14:useLocalDpi xmlns:a14="http://schemas.microsoft.com/office/drawing/2010/main" val="0"/>
+              </a:ext>
+            </a:extLst>
+          </a:blip>
+          <a:stretch>
+            <a:fillRect/>
+          </a:stretch>
+        </p:blipFill>
+        <p:spPr>
+          <a:xfrm>
+            <a:off x="913893" y="2095789"/>
+            <a:ext cx="4580952" cy="4628571"/>
+          </a:xfrm>
+          <a:prstGeom prst="rect">
+            <a:avLst/>
+          </a:prstGeom>
+        </p:spPr>
+      </p:pic>
+    </p:spTree>
+    <p:extLst>
+      <p:ext uri="{BB962C8B-B14F-4D97-AF65-F5344CB8AC3E}">
+        <p14:creationId xmlns:p14="http://schemas.microsoft.com/office/powerpoint/2010/main" val="4183202154"/>
       </p:ext>
     </p:extLst>
   </p:cSld>

</xml_diff>

<commit_message>
work on QM talk; change cover
</commit_message>
<xml_diff>
--- a/images/cover-peng.pptx
+++ b/images/cover-peng.pptx
@@ -7,8 +7,9 @@
   <p:sldIdLst>
     <p:sldId id="256" r:id="rId2"/>
     <p:sldId id="259" r:id="rId3"/>
-    <p:sldId id="257" r:id="rId4"/>
-    <p:sldId id="258" r:id="rId5"/>
+    <p:sldId id="260" r:id="rId4"/>
+    <p:sldId id="257" r:id="rId5"/>
+    <p:sldId id="258" r:id="rId6"/>
   </p:sldIdLst>
   <p:sldSz cx="6408738" cy="8820150"/>
   <p:notesSz cx="6858000" cy="9144000"/>
@@ -246,7 +247,7 @@
           <a:p>
             <a:fld id="{8182B686-9897-4DFC-99DC-E49E7D95CC9D}" type="datetimeFigureOut">
               <a:rPr lang="en-CA" smtClean="0"/>
-              <a:t>2023-08-01</a:t>
+              <a:t>2024-03-01</a:t>
             </a:fld>
             <a:endParaRPr lang="en-CA"/>
           </a:p>
@@ -416,7 +417,7 @@
           <a:p>
             <a:fld id="{8182B686-9897-4DFC-99DC-E49E7D95CC9D}" type="datetimeFigureOut">
               <a:rPr lang="en-CA" smtClean="0"/>
-              <a:t>2023-08-01</a:t>
+              <a:t>2024-03-01</a:t>
             </a:fld>
             <a:endParaRPr lang="en-CA"/>
           </a:p>
@@ -596,7 +597,7 @@
           <a:p>
             <a:fld id="{8182B686-9897-4DFC-99DC-E49E7D95CC9D}" type="datetimeFigureOut">
               <a:rPr lang="en-CA" smtClean="0"/>
-              <a:t>2023-08-01</a:t>
+              <a:t>2024-03-01</a:t>
             </a:fld>
             <a:endParaRPr lang="en-CA"/>
           </a:p>
@@ -766,7 +767,7 @@
           <a:p>
             <a:fld id="{8182B686-9897-4DFC-99DC-E49E7D95CC9D}" type="datetimeFigureOut">
               <a:rPr lang="en-CA" smtClean="0"/>
-              <a:t>2023-08-01</a:t>
+              <a:t>2024-03-01</a:t>
             </a:fld>
             <a:endParaRPr lang="en-CA"/>
           </a:p>
@@ -1010,7 +1011,7 @@
           <a:p>
             <a:fld id="{8182B686-9897-4DFC-99DC-E49E7D95CC9D}" type="datetimeFigureOut">
               <a:rPr lang="en-CA" smtClean="0"/>
-              <a:t>2023-08-01</a:t>
+              <a:t>2024-03-01</a:t>
             </a:fld>
             <a:endParaRPr lang="en-CA"/>
           </a:p>
@@ -1242,7 +1243,7 @@
           <a:p>
             <a:fld id="{8182B686-9897-4DFC-99DC-E49E7D95CC9D}" type="datetimeFigureOut">
               <a:rPr lang="en-CA" smtClean="0"/>
-              <a:t>2023-08-01</a:t>
+              <a:t>2024-03-01</a:t>
             </a:fld>
             <a:endParaRPr lang="en-CA"/>
           </a:p>
@@ -1609,7 +1610,7 @@
           <a:p>
             <a:fld id="{8182B686-9897-4DFC-99DC-E49E7D95CC9D}" type="datetimeFigureOut">
               <a:rPr lang="en-CA" smtClean="0"/>
-              <a:t>2023-08-01</a:t>
+              <a:t>2024-03-01</a:t>
             </a:fld>
             <a:endParaRPr lang="en-CA"/>
           </a:p>
@@ -1727,7 +1728,7 @@
           <a:p>
             <a:fld id="{8182B686-9897-4DFC-99DC-E49E7D95CC9D}" type="datetimeFigureOut">
               <a:rPr lang="en-CA" smtClean="0"/>
-              <a:t>2023-08-01</a:t>
+              <a:t>2024-03-01</a:t>
             </a:fld>
             <a:endParaRPr lang="en-CA"/>
           </a:p>
@@ -1822,7 +1823,7 @@
           <a:p>
             <a:fld id="{8182B686-9897-4DFC-99DC-E49E7D95CC9D}" type="datetimeFigureOut">
               <a:rPr lang="en-CA" smtClean="0"/>
-              <a:t>2023-08-01</a:t>
+              <a:t>2024-03-01</a:t>
             </a:fld>
             <a:endParaRPr lang="en-CA"/>
           </a:p>
@@ -2099,7 +2100,7 @@
           <a:p>
             <a:fld id="{8182B686-9897-4DFC-99DC-E49E7D95CC9D}" type="datetimeFigureOut">
               <a:rPr lang="en-CA" smtClean="0"/>
-              <a:t>2023-08-01</a:t>
+              <a:t>2024-03-01</a:t>
             </a:fld>
             <a:endParaRPr lang="en-CA"/>
           </a:p>
@@ -2356,7 +2357,7 @@
           <a:p>
             <a:fld id="{8182B686-9897-4DFC-99DC-E49E7D95CC9D}" type="datetimeFigureOut">
               <a:rPr lang="en-CA" smtClean="0"/>
-              <a:t>2023-08-01</a:t>
+              <a:t>2024-03-01</a:t>
             </a:fld>
             <a:endParaRPr lang="en-CA"/>
           </a:p>
@@ -2569,7 +2570,7 @@
           <a:p>
             <a:fld id="{8182B686-9897-4DFC-99DC-E49E7D95CC9D}" type="datetimeFigureOut">
               <a:rPr lang="en-CA" smtClean="0"/>
-              <a:t>2023-08-01</a:t>
+              <a:t>2024-03-01</a:t>
             </a:fld>
             <a:endParaRPr lang="en-CA"/>
           </a:p>
@@ -3109,10 +3110,35 @@
   <p:cSld>
     <p:bg>
       <p:bgPr>
-        <a:blipFill>
-          <a:blip r:embed="rId2"/>
-          <a:tile tx="0" ty="0" sx="100000" sy="100000" flip="none" algn="tl"/>
-        </a:blipFill>
+        <a:gradFill>
+          <a:gsLst>
+            <a:gs pos="0">
+              <a:schemeClr val="accent1">
+                <a:lumMod val="5000"/>
+                <a:lumOff val="95000"/>
+              </a:schemeClr>
+            </a:gs>
+            <a:gs pos="74000">
+              <a:schemeClr val="accent1">
+                <a:lumMod val="45000"/>
+                <a:lumOff val="55000"/>
+              </a:schemeClr>
+            </a:gs>
+            <a:gs pos="83000">
+              <a:schemeClr val="accent1">
+                <a:lumMod val="45000"/>
+                <a:lumOff val="55000"/>
+              </a:schemeClr>
+            </a:gs>
+            <a:gs pos="100000">
+              <a:schemeClr val="accent1">
+                <a:lumMod val="30000"/>
+                <a:lumOff val="70000"/>
+              </a:schemeClr>
+            </a:gs>
+          </a:gsLst>
+          <a:lin ang="5400000" scaled="1"/>
+        </a:gradFill>
         <a:effectLst/>
       </p:bgPr>
     </p:bg>
@@ -3144,8 +3170,8 @@
         </p:nvSpPr>
         <p:spPr>
           <a:xfrm>
-            <a:off x="846005" y="920911"/>
-            <a:ext cx="4824663" cy="1077218"/>
+            <a:off x="490652" y="653463"/>
+            <a:ext cx="5542155" cy="1138773"/>
           </a:xfrm>
           <a:prstGeom prst="rect">
             <a:avLst/>
@@ -3160,7 +3186,7 @@
           <a:p>
             <a:pPr algn="ctr"/>
             <a:r>
-              <a:rPr lang="en-CA" sz="3200" dirty="0"/>
+              <a:rPr lang="en-CA" sz="3400" dirty="0"/>
               <a:t>Visualization of Multivariate Data and Models in R</a:t>
             </a:r>
           </a:p>
@@ -3180,8 +3206,8 @@
         </p:nvSpPr>
         <p:spPr>
           <a:xfrm>
-            <a:off x="846005" y="2124068"/>
-            <a:ext cx="4824663" cy="369332"/>
+            <a:off x="849398" y="1851102"/>
+            <a:ext cx="4824663" cy="461665"/>
           </a:xfrm>
           <a:prstGeom prst="rect">
             <a:avLst/>
@@ -3196,7 +3222,7 @@
           <a:p>
             <a:pPr algn="ctr"/>
             <a:r>
-              <a:rPr lang="en-CA" dirty="0"/>
+              <a:rPr lang="en-CA" sz="2400" dirty="0"/>
               <a:t>Michael Friendly</a:t>
             </a:r>
           </a:p>
@@ -3208,6 +3234,42 @@
             <a:extLst>
               <a:ext uri="{FF2B5EF4-FFF2-40B4-BE49-F238E27FC236}">
                 <a16:creationId xmlns:a16="http://schemas.microsoft.com/office/drawing/2014/main" id="{18B8CD33-D073-4FEF-1AE6-CA32CFC0056C}"/>
+              </a:ext>
+            </a:extLst>
+          </p:cNvPr>
+          <p:cNvPicPr>
+            <a:picLocks noChangeAspect="1"/>
+          </p:cNvPicPr>
+          <p:nvPr/>
+        </p:nvPicPr>
+        <p:blipFill>
+          <a:blip r:embed="rId2">
+            <a:extLst>
+              <a:ext uri="{28A0092B-C50C-407E-A947-70E740481C1C}">
+                <a14:useLocalDpi xmlns:a14="http://schemas.microsoft.com/office/drawing/2010/main" val="0"/>
+              </a:ext>
+            </a:extLst>
+          </a:blip>
+          <a:stretch>
+            <a:fillRect/>
+          </a:stretch>
+        </p:blipFill>
+        <p:spPr>
+          <a:xfrm>
+            <a:off x="914400" y="2834640"/>
+            <a:ext cx="4580952" cy="4628571"/>
+          </a:xfrm>
+          <a:prstGeom prst="rect">
+            <a:avLst/>
+          </a:prstGeom>
+        </p:spPr>
+      </p:pic>
+      <p:pic>
+        <p:nvPicPr>
+          <p:cNvPr id="6" name="Picture 5" descr="A blue text on a black background&#10;&#10;Description automatically generated">
+            <a:extLst>
+              <a:ext uri="{FF2B5EF4-FFF2-40B4-BE49-F238E27FC236}">
+                <a16:creationId xmlns:a16="http://schemas.microsoft.com/office/drawing/2014/main" id="{CB4BFDD2-BD03-0F42-08FD-74A7E3835784}"/>
               </a:ext>
             </a:extLst>
           </p:cNvPr>
@@ -3230,8 +3292,8 @@
         </p:blipFill>
         <p:spPr>
           <a:xfrm>
-            <a:off x="846005" y="3270668"/>
-            <a:ext cx="4580952" cy="4628571"/>
+            <a:off x="1855126" y="7899239"/>
+            <a:ext cx="2806420" cy="833156"/>
           </a:xfrm>
           <a:prstGeom prst="rect">
             <a:avLst/>
@@ -3252,6 +3314,214 @@
 </file>
 
 <file path=ppt/slides/slide3.xml><?xml version="1.0" encoding="utf-8"?>
+<p:sld xmlns:a="http://schemas.openxmlformats.org/drawingml/2006/main" xmlns:r="http://schemas.openxmlformats.org/officeDocument/2006/relationships" xmlns:p="http://schemas.openxmlformats.org/presentationml/2006/main">
+  <p:cSld>
+    <p:bg>
+      <p:bgPr>
+        <a:gradFill>
+          <a:gsLst>
+            <a:gs pos="0">
+              <a:schemeClr val="accent1">
+                <a:lumMod val="5000"/>
+                <a:lumOff val="95000"/>
+              </a:schemeClr>
+            </a:gs>
+            <a:gs pos="74000">
+              <a:schemeClr val="accent1">
+                <a:lumMod val="45000"/>
+                <a:lumOff val="55000"/>
+              </a:schemeClr>
+            </a:gs>
+            <a:gs pos="83000">
+              <a:schemeClr val="accent1">
+                <a:lumMod val="45000"/>
+                <a:lumOff val="55000"/>
+              </a:schemeClr>
+            </a:gs>
+            <a:gs pos="100000">
+              <a:schemeClr val="accent1">
+                <a:lumMod val="30000"/>
+                <a:lumOff val="70000"/>
+              </a:schemeClr>
+            </a:gs>
+          </a:gsLst>
+          <a:lin ang="5400000" scaled="1"/>
+        </a:gradFill>
+        <a:effectLst/>
+      </p:bgPr>
+    </p:bg>
+    <p:spTree>
+      <p:nvGrpSpPr>
+        <p:cNvPr id="1" name=""/>
+        <p:cNvGrpSpPr/>
+        <p:nvPr/>
+      </p:nvGrpSpPr>
+      <p:grpSpPr>
+        <a:xfrm>
+          <a:off x="0" y="0"/>
+          <a:ext cx="0" cy="0"/>
+          <a:chOff x="0" y="0"/>
+          <a:chExt cx="0" cy="0"/>
+        </a:xfrm>
+      </p:grpSpPr>
+      <p:sp>
+        <p:nvSpPr>
+          <p:cNvPr id="4" name="TextBox 3">
+            <a:extLst>
+              <a:ext uri="{FF2B5EF4-FFF2-40B4-BE49-F238E27FC236}">
+                <a16:creationId xmlns:a16="http://schemas.microsoft.com/office/drawing/2014/main" id="{447B398F-7870-9F4B-9595-03B0D5EEAFDC}"/>
+              </a:ext>
+            </a:extLst>
+          </p:cNvPr>
+          <p:cNvSpPr txBox="1"/>
+          <p:nvPr/>
+        </p:nvSpPr>
+        <p:spPr>
+          <a:xfrm>
+            <a:off x="490652" y="653463"/>
+            <a:ext cx="5542155" cy="1138773"/>
+          </a:xfrm>
+          <a:prstGeom prst="rect">
+            <a:avLst/>
+          </a:prstGeom>
+          <a:noFill/>
+        </p:spPr>
+        <p:txBody>
+          <a:bodyPr wrap="square" rtlCol="0">
+            <a:spAutoFit/>
+          </a:bodyPr>
+          <a:lstStyle/>
+          <a:p>
+            <a:pPr algn="ctr"/>
+            <a:r>
+              <a:rPr lang="en-CA" sz="3400" dirty="0"/>
+              <a:t>Visualization of Multivariate Data and Models in R</a:t>
+            </a:r>
+          </a:p>
+        </p:txBody>
+      </p:sp>
+      <p:sp>
+        <p:nvSpPr>
+          <p:cNvPr id="5" name="TextBox 4">
+            <a:extLst>
+              <a:ext uri="{FF2B5EF4-FFF2-40B4-BE49-F238E27FC236}">
+                <a16:creationId xmlns:a16="http://schemas.microsoft.com/office/drawing/2014/main" id="{DFC20333-DD61-C369-0226-00FAF2A071B0}"/>
+              </a:ext>
+            </a:extLst>
+          </p:cNvPr>
+          <p:cNvSpPr txBox="1"/>
+          <p:nvPr/>
+        </p:nvSpPr>
+        <p:spPr>
+          <a:xfrm>
+            <a:off x="849398" y="1851102"/>
+            <a:ext cx="4824663" cy="461665"/>
+          </a:xfrm>
+          <a:prstGeom prst="rect">
+            <a:avLst/>
+          </a:prstGeom>
+          <a:noFill/>
+        </p:spPr>
+        <p:txBody>
+          <a:bodyPr wrap="square" rtlCol="0">
+            <a:spAutoFit/>
+          </a:bodyPr>
+          <a:lstStyle/>
+          <a:p>
+            <a:pPr algn="ctr"/>
+            <a:r>
+              <a:rPr lang="en-CA" sz="2400" dirty="0"/>
+              <a:t>Michael Friendly</a:t>
+            </a:r>
+          </a:p>
+        </p:txBody>
+      </p:sp>
+      <p:pic>
+        <p:nvPicPr>
+          <p:cNvPr id="6" name="Picture 5" descr="A blue text on a black background&#10;&#10;Description automatically generated">
+            <a:extLst>
+              <a:ext uri="{FF2B5EF4-FFF2-40B4-BE49-F238E27FC236}">
+                <a16:creationId xmlns:a16="http://schemas.microsoft.com/office/drawing/2014/main" id="{CB4BFDD2-BD03-0F42-08FD-74A7E3835784}"/>
+              </a:ext>
+            </a:extLst>
+          </p:cNvPr>
+          <p:cNvPicPr>
+            <a:picLocks noChangeAspect="1"/>
+          </p:cNvPicPr>
+          <p:nvPr/>
+        </p:nvPicPr>
+        <p:blipFill>
+          <a:blip r:embed="rId2">
+            <a:extLst>
+              <a:ext uri="{28A0092B-C50C-407E-A947-70E740481C1C}">
+                <a14:useLocalDpi xmlns:a14="http://schemas.microsoft.com/office/drawing/2010/main" val="0"/>
+              </a:ext>
+            </a:extLst>
+          </a:blip>
+          <a:stretch>
+            <a:fillRect/>
+          </a:stretch>
+        </p:blipFill>
+        <p:spPr>
+          <a:xfrm>
+            <a:off x="1855126" y="7899239"/>
+            <a:ext cx="2806420" cy="833156"/>
+          </a:xfrm>
+          <a:prstGeom prst="rect">
+            <a:avLst/>
+          </a:prstGeom>
+        </p:spPr>
+      </p:pic>
+      <p:pic>
+        <p:nvPicPr>
+          <p:cNvPr id="3" name="Picture 2">
+            <a:extLst>
+              <a:ext uri="{FF2B5EF4-FFF2-40B4-BE49-F238E27FC236}">
+                <a16:creationId xmlns:a16="http://schemas.microsoft.com/office/drawing/2014/main" id="{44447F5F-33EE-3AC4-5A08-076E971A1BB1}"/>
+              </a:ext>
+            </a:extLst>
+          </p:cNvPr>
+          <p:cNvPicPr>
+            <a:picLocks noChangeAspect="1"/>
+          </p:cNvPicPr>
+          <p:nvPr/>
+        </p:nvPicPr>
+        <p:blipFill>
+          <a:blip r:embed="rId3">
+            <a:extLst>
+              <a:ext uri="{28A0092B-C50C-407E-A947-70E740481C1C}">
+                <a14:useLocalDpi xmlns:a14="http://schemas.microsoft.com/office/drawing/2010/main" val="0"/>
+              </a:ext>
+            </a:extLst>
+          </a:blip>
+          <a:stretch>
+            <a:fillRect/>
+          </a:stretch>
+        </p:blipFill>
+        <p:spPr>
+          <a:xfrm>
+            <a:off x="914400" y="2834640"/>
+            <a:ext cx="4876800" cy="4876800"/>
+          </a:xfrm>
+          <a:prstGeom prst="rect">
+            <a:avLst/>
+          </a:prstGeom>
+        </p:spPr>
+      </p:pic>
+    </p:spTree>
+    <p:extLst>
+      <p:ext uri="{BB962C8B-B14F-4D97-AF65-F5344CB8AC3E}">
+        <p14:creationId xmlns:p14="http://schemas.microsoft.com/office/powerpoint/2010/main" val="2392917060"/>
+      </p:ext>
+    </p:extLst>
+  </p:cSld>
+  <p:clrMapOvr>
+    <a:masterClrMapping/>
+  </p:clrMapOvr>
+</p:sld>
+</file>
+
+<file path=ppt/slides/slide4.xml><?xml version="1.0" encoding="utf-8"?>
 <p:sld xmlns:a="http://schemas.openxmlformats.org/drawingml/2006/main" xmlns:r="http://schemas.openxmlformats.org/officeDocument/2006/relationships" xmlns:p="http://schemas.openxmlformats.org/presentationml/2006/main">
   <p:cSld>
     <p:bg>
@@ -3291,8 +3561,8 @@
         </p:nvSpPr>
         <p:spPr>
           <a:xfrm>
-            <a:off x="846005" y="920911"/>
-            <a:ext cx="4824663" cy="1077218"/>
+            <a:off x="479502" y="731520"/>
+            <a:ext cx="5452947" cy="1138773"/>
           </a:xfrm>
           <a:prstGeom prst="rect">
             <a:avLst/>
@@ -3307,7 +3577,7 @@
           <a:p>
             <a:pPr algn="ctr"/>
             <a:r>
-              <a:rPr lang="en-CA" sz="3200" dirty="0"/>
+              <a:rPr lang="en-CA" sz="3400" dirty="0"/>
               <a:t>Visualization of Multivariate Data and Models in R</a:t>
             </a:r>
           </a:p>
@@ -3327,7 +3597,7 @@
         </p:nvSpPr>
         <p:spPr>
           <a:xfrm>
-            <a:off x="846005" y="2124068"/>
+            <a:off x="846005" y="1828800"/>
             <a:ext cx="4824663" cy="369332"/>
           </a:xfrm>
           <a:prstGeom prst="rect">
@@ -3377,8 +3647,44 @@
         </p:blipFill>
         <p:spPr>
           <a:xfrm>
-            <a:off x="846005" y="3022439"/>
+            <a:off x="914400" y="2834640"/>
             <a:ext cx="4876800" cy="4876800"/>
+          </a:xfrm>
+          <a:prstGeom prst="rect">
+            <a:avLst/>
+          </a:prstGeom>
+        </p:spPr>
+      </p:pic>
+      <p:pic>
+        <p:nvPicPr>
+          <p:cNvPr id="2" name="Picture 1" descr="A blue text on a black background&#10;&#10;Description automatically generated">
+            <a:extLst>
+              <a:ext uri="{FF2B5EF4-FFF2-40B4-BE49-F238E27FC236}">
+                <a16:creationId xmlns:a16="http://schemas.microsoft.com/office/drawing/2014/main" id="{BCF61244-4B62-583A-7377-2A4BD7285137}"/>
+              </a:ext>
+            </a:extLst>
+          </p:cNvPr>
+          <p:cNvPicPr>
+            <a:picLocks noChangeAspect="1"/>
+          </p:cNvPicPr>
+          <p:nvPr/>
+        </p:nvPicPr>
+        <p:blipFill>
+          <a:blip r:embed="rId4">
+            <a:extLst>
+              <a:ext uri="{28A0092B-C50C-407E-A947-70E740481C1C}">
+                <a14:useLocalDpi xmlns:a14="http://schemas.microsoft.com/office/drawing/2010/main" val="0"/>
+              </a:ext>
+            </a:extLst>
+          </a:blip>
+          <a:stretch>
+            <a:fillRect/>
+          </a:stretch>
+        </p:blipFill>
+        <p:spPr>
+          <a:xfrm>
+            <a:off x="1855126" y="7899239"/>
+            <a:ext cx="2806420" cy="833156"/>
           </a:xfrm>
           <a:prstGeom prst="rect">
             <a:avLst/>
@@ -3398,7 +3704,7 @@
 </p:sld>
 </file>
 
-<file path=ppt/slides/slide4.xml><?xml version="1.0" encoding="utf-8"?>
+<file path=ppt/slides/slide5.xml><?xml version="1.0" encoding="utf-8"?>
 <p:sld xmlns:a="http://schemas.openxmlformats.org/drawingml/2006/main" xmlns:r="http://schemas.openxmlformats.org/officeDocument/2006/relationships" xmlns:p="http://schemas.openxmlformats.org/presentationml/2006/main">
   <p:cSld>
     <p:spTree>

</xml_diff>

<commit_message>
small changes in HTML
</commit_message>
<xml_diff>
--- a/images/cover-peng.pptx
+++ b/images/cover-peng.pptx
@@ -247,7 +247,7 @@
           <a:p>
             <a:fld id="{8182B686-9897-4DFC-99DC-E49E7D95CC9D}" type="datetimeFigureOut">
               <a:rPr lang="en-CA" smtClean="0"/>
-              <a:t>2024-03-01</a:t>
+              <a:t>2025-07-30</a:t>
             </a:fld>
             <a:endParaRPr lang="en-CA"/>
           </a:p>
@@ -417,7 +417,7 @@
           <a:p>
             <a:fld id="{8182B686-9897-4DFC-99DC-E49E7D95CC9D}" type="datetimeFigureOut">
               <a:rPr lang="en-CA" smtClean="0"/>
-              <a:t>2024-03-01</a:t>
+              <a:t>2025-07-30</a:t>
             </a:fld>
             <a:endParaRPr lang="en-CA"/>
           </a:p>
@@ -597,7 +597,7 @@
           <a:p>
             <a:fld id="{8182B686-9897-4DFC-99DC-E49E7D95CC9D}" type="datetimeFigureOut">
               <a:rPr lang="en-CA" smtClean="0"/>
-              <a:t>2024-03-01</a:t>
+              <a:t>2025-07-30</a:t>
             </a:fld>
             <a:endParaRPr lang="en-CA"/>
           </a:p>
@@ -767,7 +767,7 @@
           <a:p>
             <a:fld id="{8182B686-9897-4DFC-99DC-E49E7D95CC9D}" type="datetimeFigureOut">
               <a:rPr lang="en-CA" smtClean="0"/>
-              <a:t>2024-03-01</a:t>
+              <a:t>2025-07-30</a:t>
             </a:fld>
             <a:endParaRPr lang="en-CA"/>
           </a:p>
@@ -1011,7 +1011,7 @@
           <a:p>
             <a:fld id="{8182B686-9897-4DFC-99DC-E49E7D95CC9D}" type="datetimeFigureOut">
               <a:rPr lang="en-CA" smtClean="0"/>
-              <a:t>2024-03-01</a:t>
+              <a:t>2025-07-30</a:t>
             </a:fld>
             <a:endParaRPr lang="en-CA"/>
           </a:p>
@@ -1243,7 +1243,7 @@
           <a:p>
             <a:fld id="{8182B686-9897-4DFC-99DC-E49E7D95CC9D}" type="datetimeFigureOut">
               <a:rPr lang="en-CA" smtClean="0"/>
-              <a:t>2024-03-01</a:t>
+              <a:t>2025-07-30</a:t>
             </a:fld>
             <a:endParaRPr lang="en-CA"/>
           </a:p>
@@ -1610,7 +1610,7 @@
           <a:p>
             <a:fld id="{8182B686-9897-4DFC-99DC-E49E7D95CC9D}" type="datetimeFigureOut">
               <a:rPr lang="en-CA" smtClean="0"/>
-              <a:t>2024-03-01</a:t>
+              <a:t>2025-07-30</a:t>
             </a:fld>
             <a:endParaRPr lang="en-CA"/>
           </a:p>
@@ -1728,7 +1728,7 @@
           <a:p>
             <a:fld id="{8182B686-9897-4DFC-99DC-E49E7D95CC9D}" type="datetimeFigureOut">
               <a:rPr lang="en-CA" smtClean="0"/>
-              <a:t>2024-03-01</a:t>
+              <a:t>2025-07-30</a:t>
             </a:fld>
             <a:endParaRPr lang="en-CA"/>
           </a:p>
@@ -1823,7 +1823,7 @@
           <a:p>
             <a:fld id="{8182B686-9897-4DFC-99DC-E49E7D95CC9D}" type="datetimeFigureOut">
               <a:rPr lang="en-CA" smtClean="0"/>
-              <a:t>2024-03-01</a:t>
+              <a:t>2025-07-30</a:t>
             </a:fld>
             <a:endParaRPr lang="en-CA"/>
           </a:p>
@@ -2100,7 +2100,7 @@
           <a:p>
             <a:fld id="{8182B686-9897-4DFC-99DC-E49E7D95CC9D}" type="datetimeFigureOut">
               <a:rPr lang="en-CA" smtClean="0"/>
-              <a:t>2024-03-01</a:t>
+              <a:t>2025-07-30</a:t>
             </a:fld>
             <a:endParaRPr lang="en-CA"/>
           </a:p>
@@ -2357,7 +2357,7 @@
           <a:p>
             <a:fld id="{8182B686-9897-4DFC-99DC-E49E7D95CC9D}" type="datetimeFigureOut">
               <a:rPr lang="en-CA" smtClean="0"/>
-              <a:t>2024-03-01</a:t>
+              <a:t>2025-07-30</a:t>
             </a:fld>
             <a:endParaRPr lang="en-CA"/>
           </a:p>
@@ -2570,7 +2570,7 @@
           <a:p>
             <a:fld id="{8182B686-9897-4DFC-99DC-E49E7D95CC9D}" type="datetimeFigureOut">
               <a:rPr lang="en-CA" smtClean="0"/>
-              <a:t>2024-03-01</a:t>
+              <a:t>2025-07-30</a:t>
             </a:fld>
             <a:endParaRPr lang="en-CA"/>
           </a:p>
@@ -3378,7 +3378,7 @@
         </p:nvSpPr>
         <p:spPr>
           <a:xfrm>
-            <a:off x="490652" y="653463"/>
+            <a:off x="490652" y="546588"/>
             <a:ext cx="5542155" cy="1138773"/>
           </a:xfrm>
           <a:prstGeom prst="rect">
@@ -3414,7 +3414,7 @@
         </p:nvSpPr>
         <p:spPr>
           <a:xfrm>
-            <a:off x="849398" y="1851102"/>
+            <a:off x="914400" y="2256426"/>
             <a:ext cx="4824663" cy="461665"/>
           </a:xfrm>
           <a:prstGeom prst="rect">
@@ -3508,6 +3508,94 @@
           </a:prstGeom>
         </p:spPr>
       </p:pic>
+      <p:sp>
+        <p:nvSpPr>
+          <p:cNvPr id="2" name="Rectangle 1">
+            <a:extLst>
+              <a:ext uri="{FF2B5EF4-FFF2-40B4-BE49-F238E27FC236}">
+                <a16:creationId xmlns:a16="http://schemas.microsoft.com/office/drawing/2014/main" id="{AEAFE10E-6CC1-ABCC-CCD0-C32FF085C36D}"/>
+              </a:ext>
+            </a:extLst>
+          </p:cNvPr>
+          <p:cNvSpPr/>
+          <p:nvPr/>
+        </p:nvSpPr>
+        <p:spPr>
+          <a:xfrm>
+            <a:off x="1508166" y="3218213"/>
+            <a:ext cx="190005" cy="178130"/>
+          </a:xfrm>
+          <a:prstGeom prst="rect">
+            <a:avLst/>
+          </a:prstGeom>
+          <a:solidFill>
+            <a:schemeClr val="bg1"/>
+          </a:solidFill>
+          <a:ln>
+            <a:noFill/>
+          </a:ln>
+        </p:spPr>
+        <p:style>
+          <a:lnRef idx="2">
+            <a:schemeClr val="accent1">
+              <a:shade val="15000"/>
+            </a:schemeClr>
+          </a:lnRef>
+          <a:fillRef idx="1">
+            <a:schemeClr val="accent1"/>
+          </a:fillRef>
+          <a:effectRef idx="0">
+            <a:schemeClr val="accent1"/>
+          </a:effectRef>
+          <a:fontRef idx="minor">
+            <a:schemeClr val="lt1"/>
+          </a:fontRef>
+        </p:style>
+        <p:txBody>
+          <a:bodyPr rtlCol="0" anchor="ctr"/>
+          <a:lstStyle/>
+          <a:p>
+            <a:pPr algn="ctr"/>
+            <a:endParaRPr lang="en-CA"/>
+          </a:p>
+        </p:txBody>
+      </p:sp>
+      <p:sp>
+        <p:nvSpPr>
+          <p:cNvPr id="7" name="TextBox 6">
+            <a:extLst>
+              <a:ext uri="{FF2B5EF4-FFF2-40B4-BE49-F238E27FC236}">
+                <a16:creationId xmlns:a16="http://schemas.microsoft.com/office/drawing/2014/main" id="{7143CBD0-7047-A033-9291-23398DD2C825}"/>
+              </a:ext>
+            </a:extLst>
+          </p:cNvPr>
+          <p:cNvSpPr txBox="1"/>
+          <p:nvPr/>
+        </p:nvSpPr>
+        <p:spPr>
+          <a:xfrm>
+            <a:off x="490652" y="1650677"/>
+            <a:ext cx="5542155" cy="461665"/>
+          </a:xfrm>
+          <a:prstGeom prst="rect">
+            <a:avLst/>
+          </a:prstGeom>
+          <a:noFill/>
+        </p:spPr>
+        <p:txBody>
+          <a:bodyPr wrap="square" rtlCol="0">
+            <a:spAutoFit/>
+          </a:bodyPr>
+          <a:lstStyle/>
+          <a:p>
+            <a:pPr algn="ctr"/>
+            <a:r>
+              <a:rPr lang="en-CA" sz="2400" dirty="0"/>
+              <a:t>A Romance in Many Dimensions</a:t>
+            </a:r>
+          </a:p>
+        </p:txBody>
+      </p:sp>
     </p:spTree>
     <p:extLst>
       <p:ext uri="{BB962C8B-B14F-4D97-AF65-F5344CB8AC3E}">

</xml_diff>

<commit_message>
build HTML & PDF
</commit_message>
<xml_diff>
--- a/images/cover-peng.pptx
+++ b/images/cover-peng.pptx
@@ -8,8 +8,9 @@
     <p:sldId id="256" r:id="rId2"/>
     <p:sldId id="259" r:id="rId3"/>
     <p:sldId id="260" r:id="rId4"/>
-    <p:sldId id="257" r:id="rId5"/>
-    <p:sldId id="258" r:id="rId6"/>
+    <p:sldId id="261" r:id="rId5"/>
+    <p:sldId id="257" r:id="rId6"/>
+    <p:sldId id="258" r:id="rId7"/>
   </p:sldIdLst>
   <p:sldSz cx="6408738" cy="8820150"/>
   <p:notesSz cx="6858000" cy="9144000"/>
@@ -247,7 +248,7 @@
           <a:p>
             <a:fld id="{8182B686-9897-4DFC-99DC-E49E7D95CC9D}" type="datetimeFigureOut">
               <a:rPr lang="en-CA" smtClean="0"/>
-              <a:t>2025-07-30</a:t>
+              <a:t>2025-09-02</a:t>
             </a:fld>
             <a:endParaRPr lang="en-CA"/>
           </a:p>
@@ -417,7 +418,7 @@
           <a:p>
             <a:fld id="{8182B686-9897-4DFC-99DC-E49E7D95CC9D}" type="datetimeFigureOut">
               <a:rPr lang="en-CA" smtClean="0"/>
-              <a:t>2025-07-30</a:t>
+              <a:t>2025-09-02</a:t>
             </a:fld>
             <a:endParaRPr lang="en-CA"/>
           </a:p>
@@ -597,7 +598,7 @@
           <a:p>
             <a:fld id="{8182B686-9897-4DFC-99DC-E49E7D95CC9D}" type="datetimeFigureOut">
               <a:rPr lang="en-CA" smtClean="0"/>
-              <a:t>2025-07-30</a:t>
+              <a:t>2025-09-02</a:t>
             </a:fld>
             <a:endParaRPr lang="en-CA"/>
           </a:p>
@@ -767,7 +768,7 @@
           <a:p>
             <a:fld id="{8182B686-9897-4DFC-99DC-E49E7D95CC9D}" type="datetimeFigureOut">
               <a:rPr lang="en-CA" smtClean="0"/>
-              <a:t>2025-07-30</a:t>
+              <a:t>2025-09-02</a:t>
             </a:fld>
             <a:endParaRPr lang="en-CA"/>
           </a:p>
@@ -1011,7 +1012,7 @@
           <a:p>
             <a:fld id="{8182B686-9897-4DFC-99DC-E49E7D95CC9D}" type="datetimeFigureOut">
               <a:rPr lang="en-CA" smtClean="0"/>
-              <a:t>2025-07-30</a:t>
+              <a:t>2025-09-02</a:t>
             </a:fld>
             <a:endParaRPr lang="en-CA"/>
           </a:p>
@@ -1243,7 +1244,7 @@
           <a:p>
             <a:fld id="{8182B686-9897-4DFC-99DC-E49E7D95CC9D}" type="datetimeFigureOut">
               <a:rPr lang="en-CA" smtClean="0"/>
-              <a:t>2025-07-30</a:t>
+              <a:t>2025-09-02</a:t>
             </a:fld>
             <a:endParaRPr lang="en-CA"/>
           </a:p>
@@ -1610,7 +1611,7 @@
           <a:p>
             <a:fld id="{8182B686-9897-4DFC-99DC-E49E7D95CC9D}" type="datetimeFigureOut">
               <a:rPr lang="en-CA" smtClean="0"/>
-              <a:t>2025-07-30</a:t>
+              <a:t>2025-09-02</a:t>
             </a:fld>
             <a:endParaRPr lang="en-CA"/>
           </a:p>
@@ -1728,7 +1729,7 @@
           <a:p>
             <a:fld id="{8182B686-9897-4DFC-99DC-E49E7D95CC9D}" type="datetimeFigureOut">
               <a:rPr lang="en-CA" smtClean="0"/>
-              <a:t>2025-07-30</a:t>
+              <a:t>2025-09-02</a:t>
             </a:fld>
             <a:endParaRPr lang="en-CA"/>
           </a:p>
@@ -1823,7 +1824,7 @@
           <a:p>
             <a:fld id="{8182B686-9897-4DFC-99DC-E49E7D95CC9D}" type="datetimeFigureOut">
               <a:rPr lang="en-CA" smtClean="0"/>
-              <a:t>2025-07-30</a:t>
+              <a:t>2025-09-02</a:t>
             </a:fld>
             <a:endParaRPr lang="en-CA"/>
           </a:p>
@@ -2100,7 +2101,7 @@
           <a:p>
             <a:fld id="{8182B686-9897-4DFC-99DC-E49E7D95CC9D}" type="datetimeFigureOut">
               <a:rPr lang="en-CA" smtClean="0"/>
-              <a:t>2025-07-30</a:t>
+              <a:t>2025-09-02</a:t>
             </a:fld>
             <a:endParaRPr lang="en-CA"/>
           </a:p>
@@ -2357,7 +2358,7 @@
           <a:p>
             <a:fld id="{8182B686-9897-4DFC-99DC-E49E7D95CC9D}" type="datetimeFigureOut">
               <a:rPr lang="en-CA" smtClean="0"/>
-              <a:t>2025-07-30</a:t>
+              <a:t>2025-09-02</a:t>
             </a:fld>
             <a:endParaRPr lang="en-CA"/>
           </a:p>
@@ -2570,7 +2571,7 @@
           <a:p>
             <a:fld id="{8182B686-9897-4DFC-99DC-E49E7D95CC9D}" type="datetimeFigureOut">
               <a:rPr lang="en-CA" smtClean="0"/>
-              <a:t>2025-07-30</a:t>
+              <a:t>2025-09-02</a:t>
             </a:fld>
             <a:endParaRPr lang="en-CA"/>
           </a:p>
@@ -3590,7 +3591,7 @@
           <a:p>
             <a:pPr algn="ctr"/>
             <a:r>
-              <a:rPr lang="en-CA" sz="2400" dirty="0"/>
+              <a:rPr lang="en-CA" sz="2400" i="1" dirty="0"/>
               <a:t>A Romance in Many Dimensions</a:t>
             </a:r>
           </a:p>
@@ -3610,6 +3611,308 @@
 </file>
 
 <file path=ppt/slides/slide4.xml><?xml version="1.0" encoding="utf-8"?>
+<p:sld xmlns:a="http://schemas.openxmlformats.org/drawingml/2006/main" xmlns:r="http://schemas.openxmlformats.org/officeDocument/2006/relationships" xmlns:p="http://schemas.openxmlformats.org/presentationml/2006/main">
+  <p:cSld>
+    <p:bg>
+      <p:bgPr>
+        <a:gradFill>
+          <a:gsLst>
+            <a:gs pos="0">
+              <a:schemeClr val="accent1">
+                <a:lumMod val="5000"/>
+                <a:lumOff val="95000"/>
+              </a:schemeClr>
+            </a:gs>
+            <a:gs pos="74000">
+              <a:schemeClr val="accent1">
+                <a:lumMod val="45000"/>
+                <a:lumOff val="55000"/>
+              </a:schemeClr>
+            </a:gs>
+            <a:gs pos="83000">
+              <a:schemeClr val="accent1">
+                <a:lumMod val="45000"/>
+                <a:lumOff val="55000"/>
+              </a:schemeClr>
+            </a:gs>
+            <a:gs pos="100000">
+              <a:schemeClr val="accent1">
+                <a:lumMod val="30000"/>
+                <a:lumOff val="70000"/>
+              </a:schemeClr>
+            </a:gs>
+          </a:gsLst>
+          <a:lin ang="5400000" scaled="1"/>
+        </a:gradFill>
+        <a:effectLst/>
+      </p:bgPr>
+    </p:bg>
+    <p:spTree>
+      <p:nvGrpSpPr>
+        <p:cNvPr id="1" name="">
+          <a:extLst>
+            <a:ext uri="{FF2B5EF4-FFF2-40B4-BE49-F238E27FC236}">
+              <a16:creationId xmlns:a16="http://schemas.microsoft.com/office/drawing/2014/main" id="{5347C6CE-9E5F-70B8-025B-BA9CDC19CE1F}"/>
+            </a:ext>
+          </a:extLst>
+        </p:cNvPr>
+        <p:cNvGrpSpPr/>
+        <p:nvPr/>
+      </p:nvGrpSpPr>
+      <p:grpSpPr>
+        <a:xfrm>
+          <a:off x="0" y="0"/>
+          <a:ext cx="0" cy="0"/>
+          <a:chOff x="0" y="0"/>
+          <a:chExt cx="0" cy="0"/>
+        </a:xfrm>
+      </p:grpSpPr>
+      <p:sp>
+        <p:nvSpPr>
+          <p:cNvPr id="4" name="TextBox 3">
+            <a:extLst>
+              <a:ext uri="{FF2B5EF4-FFF2-40B4-BE49-F238E27FC236}">
+                <a16:creationId xmlns:a16="http://schemas.microsoft.com/office/drawing/2014/main" id="{15086F9F-50C5-A698-9691-B0623F7DE445}"/>
+              </a:ext>
+            </a:extLst>
+          </p:cNvPr>
+          <p:cNvSpPr txBox="1"/>
+          <p:nvPr/>
+        </p:nvSpPr>
+        <p:spPr>
+          <a:xfrm>
+            <a:off x="490652" y="546588"/>
+            <a:ext cx="5542155" cy="1138773"/>
+          </a:xfrm>
+          <a:prstGeom prst="rect">
+            <a:avLst/>
+          </a:prstGeom>
+          <a:noFill/>
+        </p:spPr>
+        <p:txBody>
+          <a:bodyPr wrap="square" rtlCol="0">
+            <a:spAutoFit/>
+          </a:bodyPr>
+          <a:lstStyle/>
+          <a:p>
+            <a:pPr algn="ctr"/>
+            <a:r>
+              <a:rPr lang="en-CA" sz="3400" dirty="0"/>
+              <a:t>Visualization of Multivariate Data and Models in R</a:t>
+            </a:r>
+          </a:p>
+        </p:txBody>
+      </p:sp>
+      <p:sp>
+        <p:nvSpPr>
+          <p:cNvPr id="5" name="TextBox 4">
+            <a:extLst>
+              <a:ext uri="{FF2B5EF4-FFF2-40B4-BE49-F238E27FC236}">
+                <a16:creationId xmlns:a16="http://schemas.microsoft.com/office/drawing/2014/main" id="{C5294353-BFF1-92AF-5A7D-447F49B8090C}"/>
+              </a:ext>
+            </a:extLst>
+          </p:cNvPr>
+          <p:cNvSpPr txBox="1"/>
+          <p:nvPr/>
+        </p:nvSpPr>
+        <p:spPr>
+          <a:xfrm>
+            <a:off x="914400" y="2256426"/>
+            <a:ext cx="4824663" cy="461665"/>
+          </a:xfrm>
+          <a:prstGeom prst="rect">
+            <a:avLst/>
+          </a:prstGeom>
+          <a:noFill/>
+        </p:spPr>
+        <p:txBody>
+          <a:bodyPr wrap="square" rtlCol="0">
+            <a:spAutoFit/>
+          </a:bodyPr>
+          <a:lstStyle/>
+          <a:p>
+            <a:pPr algn="ctr"/>
+            <a:r>
+              <a:rPr lang="en-CA" sz="2400" dirty="0"/>
+              <a:t>Michael Friendly</a:t>
+            </a:r>
+          </a:p>
+        </p:txBody>
+      </p:sp>
+      <p:pic>
+        <p:nvPicPr>
+          <p:cNvPr id="6" name="Picture 5" descr="A blue text on a black background&#10;&#10;Description automatically generated">
+            <a:extLst>
+              <a:ext uri="{FF2B5EF4-FFF2-40B4-BE49-F238E27FC236}">
+                <a16:creationId xmlns:a16="http://schemas.microsoft.com/office/drawing/2014/main" id="{75C96CF9-F714-5891-2780-A9FC0B5435AB}"/>
+              </a:ext>
+            </a:extLst>
+          </p:cNvPr>
+          <p:cNvPicPr>
+            <a:picLocks noChangeAspect="1"/>
+          </p:cNvPicPr>
+          <p:nvPr/>
+        </p:nvPicPr>
+        <p:blipFill>
+          <a:blip r:embed="rId2">
+            <a:extLst>
+              <a:ext uri="{28A0092B-C50C-407E-A947-70E740481C1C}">
+                <a14:useLocalDpi xmlns:a14="http://schemas.microsoft.com/office/drawing/2010/main" val="0"/>
+              </a:ext>
+            </a:extLst>
+          </a:blip>
+          <a:stretch>
+            <a:fillRect/>
+          </a:stretch>
+        </p:blipFill>
+        <p:spPr>
+          <a:xfrm>
+            <a:off x="1855126" y="7899239"/>
+            <a:ext cx="2806420" cy="833156"/>
+          </a:xfrm>
+          <a:prstGeom prst="rect">
+            <a:avLst/>
+          </a:prstGeom>
+        </p:spPr>
+      </p:pic>
+      <p:sp>
+        <p:nvSpPr>
+          <p:cNvPr id="2" name="Rectangle 1">
+            <a:extLst>
+              <a:ext uri="{FF2B5EF4-FFF2-40B4-BE49-F238E27FC236}">
+                <a16:creationId xmlns:a16="http://schemas.microsoft.com/office/drawing/2014/main" id="{9DB7D006-865D-3F2F-3C1C-DB7A4182A679}"/>
+              </a:ext>
+            </a:extLst>
+          </p:cNvPr>
+          <p:cNvSpPr/>
+          <p:nvPr/>
+        </p:nvSpPr>
+        <p:spPr>
+          <a:xfrm>
+            <a:off x="1508166" y="3218213"/>
+            <a:ext cx="190005" cy="178130"/>
+          </a:xfrm>
+          <a:prstGeom prst="rect">
+            <a:avLst/>
+          </a:prstGeom>
+          <a:solidFill>
+            <a:schemeClr val="bg1"/>
+          </a:solidFill>
+          <a:ln>
+            <a:noFill/>
+          </a:ln>
+        </p:spPr>
+        <p:style>
+          <a:lnRef idx="2">
+            <a:schemeClr val="accent1">
+              <a:shade val="15000"/>
+            </a:schemeClr>
+          </a:lnRef>
+          <a:fillRef idx="1">
+            <a:schemeClr val="accent1"/>
+          </a:fillRef>
+          <a:effectRef idx="0">
+            <a:schemeClr val="accent1"/>
+          </a:effectRef>
+          <a:fontRef idx="minor">
+            <a:schemeClr val="lt1"/>
+          </a:fontRef>
+        </p:style>
+        <p:txBody>
+          <a:bodyPr rtlCol="0" anchor="ctr"/>
+          <a:lstStyle/>
+          <a:p>
+            <a:pPr algn="ctr"/>
+            <a:endParaRPr lang="en-CA"/>
+          </a:p>
+        </p:txBody>
+      </p:sp>
+      <p:sp>
+        <p:nvSpPr>
+          <p:cNvPr id="7" name="TextBox 6">
+            <a:extLst>
+              <a:ext uri="{FF2B5EF4-FFF2-40B4-BE49-F238E27FC236}">
+                <a16:creationId xmlns:a16="http://schemas.microsoft.com/office/drawing/2014/main" id="{E391C50C-1379-84B3-7D6D-A599940E2D70}"/>
+              </a:ext>
+            </a:extLst>
+          </p:cNvPr>
+          <p:cNvSpPr txBox="1"/>
+          <p:nvPr/>
+        </p:nvSpPr>
+        <p:spPr>
+          <a:xfrm>
+            <a:off x="490652" y="1650677"/>
+            <a:ext cx="5542155" cy="461665"/>
+          </a:xfrm>
+          <a:prstGeom prst="rect">
+            <a:avLst/>
+          </a:prstGeom>
+          <a:noFill/>
+        </p:spPr>
+        <p:txBody>
+          <a:bodyPr wrap="square" rtlCol="0">
+            <a:spAutoFit/>
+          </a:bodyPr>
+          <a:lstStyle/>
+          <a:p>
+            <a:pPr algn="ctr"/>
+            <a:r>
+              <a:rPr lang="en-CA" sz="2400" i="1" dirty="0"/>
+              <a:t>A Romance in Many Dimensions</a:t>
+            </a:r>
+          </a:p>
+        </p:txBody>
+      </p:sp>
+      <p:pic>
+        <p:nvPicPr>
+          <p:cNvPr id="9" name="Picture 8" descr="A diagram of different colored ovals&#10;&#10;AI-generated content may be incorrect.">
+            <a:extLst>
+              <a:ext uri="{FF2B5EF4-FFF2-40B4-BE49-F238E27FC236}">
+                <a16:creationId xmlns:a16="http://schemas.microsoft.com/office/drawing/2014/main" id="{E7ACD5FD-B43B-7E74-6148-427BBDB10541}"/>
+              </a:ext>
+            </a:extLst>
+          </p:cNvPr>
+          <p:cNvPicPr>
+            <a:picLocks noChangeAspect="1"/>
+          </p:cNvPicPr>
+          <p:nvPr/>
+        </p:nvPicPr>
+        <p:blipFill>
+          <a:blip r:embed="rId3">
+            <a:extLst>
+              <a:ext uri="{28A0092B-C50C-407E-A947-70E740481C1C}">
+                <a14:useLocalDpi xmlns:a14="http://schemas.microsoft.com/office/drawing/2010/main" val="0"/>
+              </a:ext>
+            </a:extLst>
+          </a:blip>
+          <a:stretch>
+            <a:fillRect/>
+          </a:stretch>
+        </p:blipFill>
+        <p:spPr>
+          <a:xfrm>
+            <a:off x="914400" y="3057144"/>
+            <a:ext cx="4838700" cy="4600575"/>
+          </a:xfrm>
+          <a:prstGeom prst="rect">
+            <a:avLst/>
+          </a:prstGeom>
+        </p:spPr>
+      </p:pic>
+    </p:spTree>
+    <p:extLst>
+      <p:ext uri="{BB962C8B-B14F-4D97-AF65-F5344CB8AC3E}">
+        <p14:creationId xmlns:p14="http://schemas.microsoft.com/office/powerpoint/2010/main" val="2754394389"/>
+      </p:ext>
+    </p:extLst>
+  </p:cSld>
+  <p:clrMapOvr>
+    <a:masterClrMapping/>
+  </p:clrMapOvr>
+</p:sld>
+</file>
+
+<file path=ppt/slides/slide5.xml><?xml version="1.0" encoding="utf-8"?>
 <p:sld xmlns:a="http://schemas.openxmlformats.org/drawingml/2006/main" xmlns:r="http://schemas.openxmlformats.org/officeDocument/2006/relationships" xmlns:p="http://schemas.openxmlformats.org/presentationml/2006/main">
   <p:cSld>
     <p:bg>
@@ -3792,7 +4095,7 @@
 </p:sld>
 </file>
 
-<file path=ppt/slides/slide5.xml><?xml version="1.0" encoding="utf-8"?>
+<file path=ppt/slides/slide6.xml><?xml version="1.0" encoding="utf-8"?>
 <p:sld xmlns:a="http://schemas.openxmlformats.org/drawingml/2006/main" xmlns:r="http://schemas.openxmlformats.org/officeDocument/2006/relationships" xmlns:p="http://schemas.openxmlformats.org/presentationml/2006/main">
   <p:cSld>
     <p:spTree>

</xml_diff>